<commit_message>
reedit and hart_mqtt_dali added
</commit_message>
<xml_diff>
--- a/Serial_communication/src/Modbus.pptx
+++ b/Serial_communication/src/Modbus.pptx
@@ -229,7 +229,7 @@
           <a:p>
             <a:fld id="{8897FD9D-AE12-415B-9A36-A12897260BAF}" type="datetimeFigureOut">
               <a:rPr lang="cs-CZ" smtClean="0"/>
-              <a:t>15.10.2020</a:t>
+              <a:t>12.11.2023</a:t>
             </a:fld>
             <a:endParaRPr lang="cs-CZ"/>
           </a:p>
@@ -407,7 +407,7 @@
           <a:p>
             <a:fld id="{5163A614-D94B-45B8-80AB-CECDDC57E7D3}" type="datetimeFigureOut">
               <a:rPr lang="cs-CZ" smtClean="0"/>
-              <a:t>15.10.2020</a:t>
+              <a:t>12.11.2023</a:t>
             </a:fld>
             <a:endParaRPr lang="cs-CZ"/>
           </a:p>
@@ -820,9 +820,9 @@
           <a:bodyPr/>
           <a:lstStyle/>
           <a:p>
-            <a:fld id="{8C3036F0-2AF5-4D25-BC28-08EF2F23FD0A}" type="datetime1">
+            <a:fld id="{608D7AEF-3E65-3548-B111-F9E11BCF104C}" type="datetime1">
               <a:rPr lang="cs-CZ" smtClean="0"/>
-              <a:t>15.10.2020</a:t>
+              <a:t>12.11.2023</a:t>
             </a:fld>
             <a:endParaRPr lang="cs-CZ"/>
           </a:p>
@@ -849,7 +849,10 @@
           <a:bodyPr/>
           <a:lstStyle/>
           <a:p>
-            <a:endParaRPr lang="cs-CZ"/>
+            <a:r>
+              <a:rPr lang="cs-CZ"/>
+              <a:t>Akademický rok 2023/24</a:t>
+            </a:r>
           </a:p>
         </p:txBody>
       </p:sp>
@@ -1018,9 +1021,9 @@
           <a:bodyPr/>
           <a:lstStyle/>
           <a:p>
-            <a:fld id="{F0CF6B9D-C445-4254-85D6-1039F54AD86D}" type="datetime1">
+            <a:fld id="{F8B4BCA2-891D-E04C-A606-BCACE94E9668}" type="datetime1">
               <a:rPr lang="cs-CZ" smtClean="0"/>
-              <a:t>15.10.2020</a:t>
+              <a:t>12.11.2023</a:t>
             </a:fld>
             <a:endParaRPr lang="cs-CZ"/>
           </a:p>
@@ -1047,7 +1050,10 @@
           <a:bodyPr/>
           <a:lstStyle/>
           <a:p>
-            <a:endParaRPr lang="cs-CZ"/>
+            <a:r>
+              <a:rPr lang="cs-CZ"/>
+              <a:t>Akademický rok 2023/24</a:t>
+            </a:r>
           </a:p>
         </p:txBody>
       </p:sp>
@@ -1226,9 +1232,9 @@
           <a:bodyPr/>
           <a:lstStyle/>
           <a:p>
-            <a:fld id="{79B588F6-5081-4288-AC9D-B4C79B17BAC5}" type="datetime1">
+            <a:fld id="{8F57D2A7-E1FD-CD4D-AFEA-0C68A1532D7D}" type="datetime1">
               <a:rPr lang="cs-CZ" smtClean="0"/>
-              <a:t>15.10.2020</a:t>
+              <a:t>12.11.2023</a:t>
             </a:fld>
             <a:endParaRPr lang="cs-CZ"/>
           </a:p>
@@ -1255,7 +1261,10 @@
           <a:bodyPr/>
           <a:lstStyle/>
           <a:p>
-            <a:endParaRPr lang="cs-CZ"/>
+            <a:r>
+              <a:rPr lang="cs-CZ"/>
+              <a:t>Akademický rok 2023/24</a:t>
+            </a:r>
           </a:p>
         </p:txBody>
       </p:sp>
@@ -1446,9 +1455,9 @@
           <a:bodyPr/>
           <a:lstStyle/>
           <a:p>
-            <a:fld id="{2C8FB8F2-E4A2-4BCA-9B50-E8277A84C105}" type="datetime1">
+            <a:fld id="{4A0A8D25-52A6-254F-A478-0F7A8EB2ECC3}" type="datetime1">
               <a:rPr lang="cs-CZ" smtClean="0"/>
-              <a:t>15.10.2020</a:t>
+              <a:t>12.11.2023</a:t>
             </a:fld>
             <a:endParaRPr lang="cs-CZ"/>
           </a:p>
@@ -1475,7 +1484,10 @@
           <a:bodyPr/>
           <a:lstStyle/>
           <a:p>
-            <a:endParaRPr lang="cs-CZ"/>
+            <a:r>
+              <a:rPr lang="cs-CZ"/>
+              <a:t>Akademický rok 2023/24</a:t>
+            </a:r>
           </a:p>
         </p:txBody>
       </p:sp>
@@ -1644,9 +1656,9 @@
           <a:bodyPr/>
           <a:lstStyle/>
           <a:p>
-            <a:fld id="{70B5D968-83E4-4473-B3B0-47D503D83537}" type="datetime1">
+            <a:fld id="{F7AAD026-C03A-DD45-B64D-617B0504D0D0}" type="datetime1">
               <a:rPr lang="cs-CZ" smtClean="0"/>
-              <a:t>15.10.2020</a:t>
+              <a:t>12.11.2023</a:t>
             </a:fld>
             <a:endParaRPr lang="cs-CZ"/>
           </a:p>
@@ -1673,7 +1685,10 @@
           <a:bodyPr/>
           <a:lstStyle/>
           <a:p>
-            <a:endParaRPr lang="cs-CZ"/>
+            <a:r>
+              <a:rPr lang="cs-CZ"/>
+              <a:t>Akademický rok 2023/24</a:t>
+            </a:r>
           </a:p>
         </p:txBody>
       </p:sp>
@@ -1919,9 +1934,9 @@
           <a:bodyPr/>
           <a:lstStyle/>
           <a:p>
-            <a:fld id="{4C417C95-F17F-4F7C-BBD3-6AFF666A5E1D}" type="datetime1">
+            <a:fld id="{565D66C4-CD9C-2F41-B0EF-7FB8D7BBCD50}" type="datetime1">
               <a:rPr lang="cs-CZ" smtClean="0"/>
-              <a:t>15.10.2020</a:t>
+              <a:t>12.11.2023</a:t>
             </a:fld>
             <a:endParaRPr lang="cs-CZ"/>
           </a:p>
@@ -1948,7 +1963,10 @@
           <a:bodyPr/>
           <a:lstStyle/>
           <a:p>
-            <a:endParaRPr lang="cs-CZ"/>
+            <a:r>
+              <a:rPr lang="cs-CZ"/>
+              <a:t>Akademický rok 2023/24</a:t>
+            </a:r>
           </a:p>
         </p:txBody>
       </p:sp>
@@ -2184,9 +2202,9 @@
           <a:bodyPr/>
           <a:lstStyle/>
           <a:p>
-            <a:fld id="{BA8C768B-B35A-4154-B7C3-E461FCCA4CE5}" type="datetime1">
+            <a:fld id="{4BE8EE6E-5D4D-A64C-90A7-F586828F85AD}" type="datetime1">
               <a:rPr lang="cs-CZ" smtClean="0"/>
-              <a:t>15.10.2020</a:t>
+              <a:t>12.11.2023</a:t>
             </a:fld>
             <a:endParaRPr lang="cs-CZ"/>
           </a:p>
@@ -2213,7 +2231,10 @@
           <a:bodyPr/>
           <a:lstStyle/>
           <a:p>
-            <a:endParaRPr lang="cs-CZ"/>
+            <a:r>
+              <a:rPr lang="cs-CZ"/>
+              <a:t>Akademický rok 2023/24</a:t>
+            </a:r>
           </a:p>
         </p:txBody>
       </p:sp>
@@ -2596,9 +2617,9 @@
           <a:bodyPr/>
           <a:lstStyle/>
           <a:p>
-            <a:fld id="{1FB3993F-19B7-443B-8897-46DEC1DECB3C}" type="datetime1">
+            <a:fld id="{A84DC327-AE61-0949-809F-71064A2F4645}" type="datetime1">
               <a:rPr lang="cs-CZ" smtClean="0"/>
-              <a:t>15.10.2020</a:t>
+              <a:t>12.11.2023</a:t>
             </a:fld>
             <a:endParaRPr lang="cs-CZ"/>
           </a:p>
@@ -2625,7 +2646,10 @@
           <a:bodyPr/>
           <a:lstStyle/>
           <a:p>
-            <a:endParaRPr lang="cs-CZ"/>
+            <a:r>
+              <a:rPr lang="cs-CZ"/>
+              <a:t>Akademický rok 2023/24</a:t>
+            </a:r>
           </a:p>
         </p:txBody>
       </p:sp>
@@ -2737,9 +2761,9 @@
           <a:bodyPr/>
           <a:lstStyle/>
           <a:p>
-            <a:fld id="{B9B250CA-BEAD-41AF-B4A7-710D80DEDD85}" type="datetime1">
+            <a:fld id="{9981E67B-71B7-3C45-A659-3AA8208F9EA2}" type="datetime1">
               <a:rPr lang="cs-CZ" smtClean="0"/>
-              <a:t>15.10.2020</a:t>
+              <a:t>12.11.2023</a:t>
             </a:fld>
             <a:endParaRPr lang="cs-CZ"/>
           </a:p>
@@ -2766,7 +2790,10 @@
           <a:bodyPr/>
           <a:lstStyle/>
           <a:p>
-            <a:endParaRPr lang="cs-CZ"/>
+            <a:r>
+              <a:rPr lang="cs-CZ"/>
+              <a:t>Akademický rok 2023/24</a:t>
+            </a:r>
           </a:p>
         </p:txBody>
       </p:sp>
@@ -2850,9 +2877,9 @@
           <a:bodyPr/>
           <a:lstStyle/>
           <a:p>
-            <a:fld id="{10464996-3AF1-4174-A140-DBF20DBE88F5}" type="datetime1">
+            <a:fld id="{DC1091C2-B197-624A-B9A0-FD3B22A4FED1}" type="datetime1">
               <a:rPr lang="cs-CZ" smtClean="0"/>
-              <a:t>15.10.2020</a:t>
+              <a:t>12.11.2023</a:t>
             </a:fld>
             <a:endParaRPr lang="cs-CZ"/>
           </a:p>
@@ -2879,7 +2906,10 @@
           <a:bodyPr/>
           <a:lstStyle/>
           <a:p>
-            <a:endParaRPr lang="cs-CZ"/>
+            <a:r>
+              <a:rPr lang="cs-CZ"/>
+              <a:t>Akademický rok 2023/24</a:t>
+            </a:r>
           </a:p>
         </p:txBody>
       </p:sp>
@@ -3161,9 +3191,9 @@
           <a:bodyPr/>
           <a:lstStyle/>
           <a:p>
-            <a:fld id="{09A1A00B-F03D-4638-8DA7-E810D2C361CF}" type="datetime1">
+            <a:fld id="{7D548E8A-CE97-B444-BD7C-5E074F31D0DE}" type="datetime1">
               <a:rPr lang="cs-CZ" smtClean="0"/>
-              <a:t>15.10.2020</a:t>
+              <a:t>12.11.2023</a:t>
             </a:fld>
             <a:endParaRPr lang="cs-CZ"/>
           </a:p>
@@ -3190,7 +3220,10 @@
           <a:bodyPr/>
           <a:lstStyle/>
           <a:p>
-            <a:endParaRPr lang="cs-CZ"/>
+            <a:r>
+              <a:rPr lang="cs-CZ"/>
+              <a:t>Akademický rok 2023/24</a:t>
+            </a:r>
           </a:p>
         </p:txBody>
       </p:sp>
@@ -3360,9 +3393,9 @@
           <a:lstStyle/>
           <a:p>
             <a:pPr algn="ctr"/>
-            <a:fld id="{E316F59F-A63E-4905-B787-C68437A620E5}" type="datetime1">
+            <a:fld id="{2847C49B-366B-C741-BE01-1F85D4BAE95B}" type="datetime1">
               <a:rPr lang="cs-CZ" smtClean="0"/>
-              <a:t>15.10.2020</a:t>
+              <a:t>12.11.2023</a:t>
             </a:fld>
             <a:endParaRPr lang="cs-CZ" dirty="0"/>
           </a:p>
@@ -3389,6 +3422,10 @@
           <a:bodyPr/>
           <a:lstStyle/>
           <a:p>
+            <a:r>
+              <a:rPr lang="cs-CZ"/>
+              <a:t>Akademický rok 2023/24</a:t>
+            </a:r>
             <a:endParaRPr lang="cs-CZ" dirty="0"/>
           </a:p>
         </p:txBody>
@@ -3648,9 +3685,9 @@
           <a:bodyPr/>
           <a:lstStyle/>
           <a:p>
-            <a:fld id="{9BD9DF9F-DBBE-4D85-943D-024E9B97890F}" type="datetime1">
+            <a:fld id="{B8E459D9-F610-9A46-BBAD-C336EB3CD2E6}" type="datetime1">
               <a:rPr lang="cs-CZ" smtClean="0"/>
-              <a:t>15.10.2020</a:t>
+              <a:t>12.11.2023</a:t>
             </a:fld>
             <a:endParaRPr lang="cs-CZ"/>
           </a:p>
@@ -3677,7 +3714,10 @@
           <a:bodyPr/>
           <a:lstStyle/>
           <a:p>
-            <a:endParaRPr lang="cs-CZ"/>
+            <a:r>
+              <a:rPr lang="cs-CZ"/>
+              <a:t>Akademický rok 2023/24</a:t>
+            </a:r>
           </a:p>
         </p:txBody>
       </p:sp>
@@ -3846,9 +3886,9 @@
           <a:bodyPr/>
           <a:lstStyle/>
           <a:p>
-            <a:fld id="{0149F9E0-18E3-4315-B16F-1435CB30B54F}" type="datetime1">
+            <a:fld id="{77D6A77F-40A5-0B4F-9CA6-49B5BFA98889}" type="datetime1">
               <a:rPr lang="cs-CZ" smtClean="0"/>
-              <a:t>15.10.2020</a:t>
+              <a:t>12.11.2023</a:t>
             </a:fld>
             <a:endParaRPr lang="cs-CZ"/>
           </a:p>
@@ -3875,7 +3915,10 @@
           <a:bodyPr/>
           <a:lstStyle/>
           <a:p>
-            <a:endParaRPr lang="cs-CZ"/>
+            <a:r>
+              <a:rPr lang="cs-CZ"/>
+              <a:t>Akademický rok 2023/24</a:t>
+            </a:r>
           </a:p>
         </p:txBody>
       </p:sp>
@@ -4054,9 +4097,9 @@
           <a:bodyPr/>
           <a:lstStyle/>
           <a:p>
-            <a:fld id="{C2C7AC29-F8A6-4F74-A564-180902BBC325}" type="datetime1">
+            <a:fld id="{B922A2BF-D88E-924A-8D6F-63B65E2EB8BA}" type="datetime1">
               <a:rPr lang="cs-CZ" smtClean="0"/>
-              <a:t>15.10.2020</a:t>
+              <a:t>12.11.2023</a:t>
             </a:fld>
             <a:endParaRPr lang="cs-CZ"/>
           </a:p>
@@ -4083,7 +4126,10 @@
           <a:bodyPr/>
           <a:lstStyle/>
           <a:p>
-            <a:endParaRPr lang="cs-CZ"/>
+            <a:r>
+              <a:rPr lang="cs-CZ"/>
+              <a:t>Akademický rok 2023/24</a:t>
+            </a:r>
           </a:p>
         </p:txBody>
       </p:sp>
@@ -4329,9 +4375,9 @@
           <a:bodyPr/>
           <a:lstStyle/>
           <a:p>
-            <a:fld id="{EC70ECC8-81FD-404F-8618-AF2CE982DFB9}" type="datetime1">
+            <a:fld id="{DE388D49-723D-B940-B9D9-4C37744B38DC}" type="datetime1">
               <a:rPr lang="cs-CZ" smtClean="0"/>
-              <a:t>15.10.2020</a:t>
+              <a:t>12.11.2023</a:t>
             </a:fld>
             <a:endParaRPr lang="cs-CZ"/>
           </a:p>
@@ -4358,7 +4404,10 @@
           <a:bodyPr/>
           <a:lstStyle/>
           <a:p>
-            <a:endParaRPr lang="cs-CZ"/>
+            <a:r>
+              <a:rPr lang="cs-CZ"/>
+              <a:t>Akademický rok 2023/24</a:t>
+            </a:r>
           </a:p>
         </p:txBody>
       </p:sp>
@@ -4594,9 +4643,9 @@
           <a:bodyPr/>
           <a:lstStyle/>
           <a:p>
-            <a:fld id="{11A6F09D-E317-4A2F-A1BA-2DC8D417E5BC}" type="datetime1">
+            <a:fld id="{3328C967-4E37-5343-8A36-320E49CF44DC}" type="datetime1">
               <a:rPr lang="cs-CZ" smtClean="0"/>
-              <a:t>15.10.2020</a:t>
+              <a:t>12.11.2023</a:t>
             </a:fld>
             <a:endParaRPr lang="cs-CZ"/>
           </a:p>
@@ -4623,7 +4672,10 @@
           <a:bodyPr/>
           <a:lstStyle/>
           <a:p>
-            <a:endParaRPr lang="cs-CZ"/>
+            <a:r>
+              <a:rPr lang="cs-CZ"/>
+              <a:t>Akademický rok 2023/24</a:t>
+            </a:r>
           </a:p>
         </p:txBody>
       </p:sp>
@@ -5006,9 +5058,9 @@
           <a:bodyPr/>
           <a:lstStyle/>
           <a:p>
-            <a:fld id="{06539A90-2727-4345-B98F-2B616E5D1E48}" type="datetime1">
+            <a:fld id="{7196551D-322E-A34F-BCC6-C886409DB4D8}" type="datetime1">
               <a:rPr lang="cs-CZ" smtClean="0"/>
-              <a:t>15.10.2020</a:t>
+              <a:t>12.11.2023</a:t>
             </a:fld>
             <a:endParaRPr lang="cs-CZ"/>
           </a:p>
@@ -5035,7 +5087,10 @@
           <a:bodyPr/>
           <a:lstStyle/>
           <a:p>
-            <a:endParaRPr lang="cs-CZ"/>
+            <a:r>
+              <a:rPr lang="cs-CZ"/>
+              <a:t>Akademický rok 2023/24</a:t>
+            </a:r>
           </a:p>
         </p:txBody>
       </p:sp>
@@ -5147,9 +5202,9 @@
           <a:bodyPr/>
           <a:lstStyle/>
           <a:p>
-            <a:fld id="{10CABF11-D7E0-404A-83C2-FA68E7CB2AE1}" type="datetime1">
+            <a:fld id="{07AF9CDB-FABF-1149-AFD5-6DE10FA197F4}" type="datetime1">
               <a:rPr lang="cs-CZ" smtClean="0"/>
-              <a:t>15.10.2020</a:t>
+              <a:t>12.11.2023</a:t>
             </a:fld>
             <a:endParaRPr lang="cs-CZ"/>
           </a:p>
@@ -5176,7 +5231,10 @@
           <a:bodyPr/>
           <a:lstStyle/>
           <a:p>
-            <a:endParaRPr lang="cs-CZ"/>
+            <a:r>
+              <a:rPr lang="cs-CZ"/>
+              <a:t>Akademický rok 2023/24</a:t>
+            </a:r>
           </a:p>
         </p:txBody>
       </p:sp>
@@ -5260,9 +5318,9 @@
           <a:bodyPr/>
           <a:lstStyle/>
           <a:p>
-            <a:fld id="{3A65F17A-C03B-4272-BD7A-964242506AFD}" type="datetime1">
+            <a:fld id="{8C1D4079-67C2-F248-8972-941964A268CA}" type="datetime1">
               <a:rPr lang="cs-CZ" smtClean="0"/>
-              <a:t>15.10.2020</a:t>
+              <a:t>12.11.2023</a:t>
             </a:fld>
             <a:endParaRPr lang="cs-CZ"/>
           </a:p>
@@ -5289,7 +5347,10 @@
           <a:bodyPr/>
           <a:lstStyle/>
           <a:p>
-            <a:endParaRPr lang="cs-CZ"/>
+            <a:r>
+              <a:rPr lang="cs-CZ"/>
+              <a:t>Akademický rok 2023/24</a:t>
+            </a:r>
           </a:p>
         </p:txBody>
       </p:sp>
@@ -5571,9 +5632,9 @@
           <a:bodyPr/>
           <a:lstStyle/>
           <a:p>
-            <a:fld id="{2DCAE243-5CF9-49AF-ABEA-F867C0B8401C}" type="datetime1">
+            <a:fld id="{C6A9057C-61EF-0B4C-B339-C98190E566C5}" type="datetime1">
               <a:rPr lang="cs-CZ" smtClean="0"/>
-              <a:t>15.10.2020</a:t>
+              <a:t>12.11.2023</a:t>
             </a:fld>
             <a:endParaRPr lang="cs-CZ"/>
           </a:p>
@@ -5600,7 +5661,10 @@
           <a:bodyPr/>
           <a:lstStyle/>
           <a:p>
-            <a:endParaRPr lang="cs-CZ"/>
+            <a:r>
+              <a:rPr lang="cs-CZ"/>
+              <a:t>Akademický rok 2023/24</a:t>
+            </a:r>
           </a:p>
         </p:txBody>
       </p:sp>
@@ -5862,9 +5926,9 @@
           <a:bodyPr/>
           <a:lstStyle/>
           <a:p>
-            <a:fld id="{06AA35BA-4274-4D48-8995-CCA233B9B9F9}" type="datetime1">
+            <a:fld id="{720C3506-A328-7B44-B982-C9C22A9311CD}" type="datetime1">
               <a:rPr lang="cs-CZ" smtClean="0"/>
-              <a:t>15.10.2020</a:t>
+              <a:t>12.11.2023</a:t>
             </a:fld>
             <a:endParaRPr lang="cs-CZ"/>
           </a:p>
@@ -5891,7 +5955,10 @@
           <a:bodyPr/>
           <a:lstStyle/>
           <a:p>
-            <a:endParaRPr lang="cs-CZ"/>
+            <a:r>
+              <a:rPr lang="cs-CZ"/>
+              <a:t>Akademický rok 2023/24</a:t>
+            </a:r>
           </a:p>
         </p:txBody>
       </p:sp>
@@ -6103,9 +6170,9 @@
             </a:lvl1pPr>
           </a:lstStyle>
           <a:p>
-            <a:fld id="{E6EF2676-9FD6-443C-A723-8CEE4DA5F596}" type="datetime1">
+            <a:fld id="{11027F53-156B-4F4E-BEB5-CEF929DF174D}" type="datetime1">
               <a:rPr lang="cs-CZ" smtClean="0"/>
-              <a:t>15.10.2020</a:t>
+              <a:t>12.11.2023</a:t>
             </a:fld>
             <a:endParaRPr lang="cs-CZ"/>
           </a:p>
@@ -6150,7 +6217,10 @@
             </a:lvl1pPr>
           </a:lstStyle>
           <a:p>
-            <a:endParaRPr lang="cs-CZ"/>
+            <a:r>
+              <a:rPr lang="cs-CZ"/>
+              <a:t>Akademický rok 2023/24</a:t>
+            </a:r>
           </a:p>
         </p:txBody>
       </p:sp>
@@ -6672,9 +6742,9 @@
             </a:lvl1pPr>
           </a:lstStyle>
           <a:p>
-            <a:fld id="{3E120C67-13C4-4556-9C50-63193EAE4EC0}" type="datetime1">
+            <a:fld id="{888A4470-2C2B-7D46-B468-40567F54C9EB}" type="datetime1">
               <a:rPr lang="cs-CZ" smtClean="0"/>
-              <a:t>15.10.2020</a:t>
+              <a:t>12.11.2023</a:t>
             </a:fld>
             <a:endParaRPr lang="cs-CZ"/>
           </a:p>
@@ -6719,7 +6789,10 @@
             </a:lvl1pPr>
           </a:lstStyle>
           <a:p>
-            <a:endParaRPr lang="cs-CZ"/>
+            <a:r>
+              <a:rPr lang="cs-CZ"/>
+              <a:t>Akademický rok 2023/24</a:t>
+            </a:r>
           </a:p>
         </p:txBody>
       </p:sp>
@@ -7117,7 +7190,7 @@
           <a:p>
             <a:r>
               <a:rPr lang="cs-CZ" cap="small" dirty="0"/>
-              <a:t>průmyslová komunikace</a:t>
+              <a:t>sériová komunikace</a:t>
             </a:r>
           </a:p>
         </p:txBody>
@@ -7172,37 +7245,38 @@
           <a:bodyPr/>
           <a:lstStyle/>
           <a:p>
+            <a:fld id="{42C733DB-9B56-7E42-B282-82A3356B57C9}" type="datetime1">
+              <a:rPr lang="cs-CZ" smtClean="0"/>
+              <a:t>12.11.2023</a:t>
+            </a:fld>
+            <a:endParaRPr lang="cs-CZ" dirty="0"/>
+          </a:p>
+        </p:txBody>
+      </p:sp>
+      <p:sp>
+        <p:nvSpPr>
+          <p:cNvPr id="5" name="Zástupný symbol pro zápatí 4">
+            <a:extLst>
+              <a:ext uri="{FF2B5EF4-FFF2-40B4-BE49-F238E27FC236}">
+                <a16:creationId xmlns:a16="http://schemas.microsoft.com/office/drawing/2014/main" id="{1776A2F0-2D88-2044-90DB-63CBA54E07B2}"/>
+              </a:ext>
+            </a:extLst>
+          </p:cNvPr>
+          <p:cNvSpPr>
+            <a:spLocks noGrp="1"/>
+          </p:cNvSpPr>
+          <p:nvPr>
+            <p:ph type="ftr" sz="quarter" idx="11"/>
+          </p:nvPr>
+        </p:nvSpPr>
+        <p:spPr/>
+        <p:txBody>
+          <a:bodyPr/>
+          <a:lstStyle/>
+          <a:p>
             <a:r>
               <a:rPr lang="cs-CZ" dirty="0"/>
-              <a:t>12.10.2020</a:t>
-            </a:r>
-          </a:p>
-        </p:txBody>
-      </p:sp>
-      <p:sp>
-        <p:nvSpPr>
-          <p:cNvPr id="5" name="Zástupný symbol pro zápatí 4">
-            <a:extLst>
-              <a:ext uri="{FF2B5EF4-FFF2-40B4-BE49-F238E27FC236}">
-                <a16:creationId xmlns:a16="http://schemas.microsoft.com/office/drawing/2014/main" id="{1776A2F0-2D88-2044-90DB-63CBA54E07B2}"/>
-              </a:ext>
-            </a:extLst>
-          </p:cNvPr>
-          <p:cNvSpPr>
-            <a:spLocks noGrp="1"/>
-          </p:cNvSpPr>
-          <p:nvPr>
-            <p:ph type="ftr" sz="quarter" idx="11"/>
-          </p:nvPr>
-        </p:nvSpPr>
-        <p:spPr/>
-        <p:txBody>
-          <a:bodyPr/>
-          <a:lstStyle/>
-          <a:p>
-            <a:r>
-              <a:rPr lang="cs-CZ" dirty="0"/>
-              <a:t>Akademický rok 2020/21</a:t>
+              <a:t>Akademický rok 2023/24</a:t>
             </a:r>
           </a:p>
         </p:txBody>
@@ -7232,7 +7306,7 @@
               <a:rPr lang="cs-CZ" smtClean="0"/>
               <a:t>1</a:t>
             </a:fld>
-            <a:endParaRPr lang="cs-CZ"/>
+            <a:endParaRPr lang="cs-CZ" dirty="0"/>
           </a:p>
         </p:txBody>
       </p:sp>
@@ -7424,9 +7498,9 @@
           <a:lstStyle/>
           <a:p>
             <a:pPr algn="ctr"/>
-            <a:fld id="{E316F59F-A63E-4905-B787-C68437A620E5}" type="datetime1">
+            <a:fld id="{3A6795A8-B881-4149-AE2A-74B975B64A39}" type="datetime1">
               <a:rPr lang="cs-CZ" smtClean="0"/>
-              <a:t>15.10.2020</a:t>
+              <a:t>12.11.2023</a:t>
             </a:fld>
             <a:endParaRPr lang="cs-CZ" dirty="0"/>
           </a:p>
@@ -7491,6 +7565,35 @@
           </a:prstGeom>
         </p:spPr>
       </p:pic>
+      <p:sp>
+        <p:nvSpPr>
+          <p:cNvPr id="5" name="Zástupný symbol pro zápatí 4">
+            <a:extLst>
+              <a:ext uri="{FF2B5EF4-FFF2-40B4-BE49-F238E27FC236}">
+                <a16:creationId xmlns:a16="http://schemas.microsoft.com/office/drawing/2014/main" id="{55976BCE-1E6B-72C9-9400-7DFD819A66C1}"/>
+              </a:ext>
+            </a:extLst>
+          </p:cNvPr>
+          <p:cNvSpPr>
+            <a:spLocks noGrp="1"/>
+          </p:cNvSpPr>
+          <p:nvPr>
+            <p:ph type="ftr" sz="quarter" idx="11"/>
+          </p:nvPr>
+        </p:nvSpPr>
+        <p:spPr/>
+        <p:txBody>
+          <a:bodyPr/>
+          <a:lstStyle/>
+          <a:p>
+            <a:r>
+              <a:rPr lang="cs-CZ"/>
+              <a:t>Akademický rok 2023/24</a:t>
+            </a:r>
+            <a:endParaRPr lang="cs-CZ" dirty="0"/>
+          </a:p>
+        </p:txBody>
+      </p:sp>
     </p:spTree>
     <p:extLst>
       <p:ext uri="{BB962C8B-B14F-4D97-AF65-F5344CB8AC3E}">
@@ -7624,9 +7727,9 @@
           <a:lstStyle/>
           <a:p>
             <a:pPr algn="ctr"/>
-            <a:fld id="{E316F59F-A63E-4905-B787-C68437A620E5}" type="datetime1">
+            <a:fld id="{4761C9DF-B831-124F-8F61-6574784B7350}" type="datetime1">
               <a:rPr lang="cs-CZ" smtClean="0"/>
-              <a:t>15.10.2020</a:t>
+              <a:t>12.11.2023</a:t>
             </a:fld>
             <a:endParaRPr lang="cs-CZ" dirty="0"/>
           </a:p>
@@ -7691,6 +7794,35 @@
           </a:prstGeom>
         </p:spPr>
       </p:pic>
+      <p:sp>
+        <p:nvSpPr>
+          <p:cNvPr id="5" name="Zástupný symbol pro zápatí 4">
+            <a:extLst>
+              <a:ext uri="{FF2B5EF4-FFF2-40B4-BE49-F238E27FC236}">
+                <a16:creationId xmlns:a16="http://schemas.microsoft.com/office/drawing/2014/main" id="{94423597-E1A2-D81A-21B9-CB3D0639CE24}"/>
+              </a:ext>
+            </a:extLst>
+          </p:cNvPr>
+          <p:cNvSpPr>
+            <a:spLocks noGrp="1"/>
+          </p:cNvSpPr>
+          <p:nvPr>
+            <p:ph type="ftr" sz="quarter" idx="11"/>
+          </p:nvPr>
+        </p:nvSpPr>
+        <p:spPr/>
+        <p:txBody>
+          <a:bodyPr/>
+          <a:lstStyle/>
+          <a:p>
+            <a:r>
+              <a:rPr lang="cs-CZ"/>
+              <a:t>Akademický rok 2023/24</a:t>
+            </a:r>
+            <a:endParaRPr lang="cs-CZ" dirty="0"/>
+          </a:p>
+        </p:txBody>
+      </p:sp>
     </p:spTree>
     <p:extLst>
       <p:ext uri="{BB962C8B-B14F-4D97-AF65-F5344CB8AC3E}">
@@ -7840,9 +7972,9 @@
           <a:lstStyle/>
           <a:p>
             <a:pPr algn="ctr"/>
-            <a:fld id="{E316F59F-A63E-4905-B787-C68437A620E5}" type="datetime1">
+            <a:fld id="{6BBA92BF-D412-A749-9E8D-BBCCCFFBE17E}" type="datetime1">
               <a:rPr lang="cs-CZ" smtClean="0"/>
-              <a:t>15.10.2020</a:t>
+              <a:t>12.11.2023</a:t>
             </a:fld>
             <a:endParaRPr lang="cs-CZ" dirty="0"/>
           </a:p>
@@ -7907,6 +8039,35 @@
           </a:prstGeom>
         </p:spPr>
       </p:pic>
+      <p:sp>
+        <p:nvSpPr>
+          <p:cNvPr id="5" name="Zástupný symbol pro zápatí 4">
+            <a:extLst>
+              <a:ext uri="{FF2B5EF4-FFF2-40B4-BE49-F238E27FC236}">
+                <a16:creationId xmlns:a16="http://schemas.microsoft.com/office/drawing/2014/main" id="{146FBB2C-080B-96C7-ECE4-E3EEE4F23369}"/>
+              </a:ext>
+            </a:extLst>
+          </p:cNvPr>
+          <p:cNvSpPr>
+            <a:spLocks noGrp="1"/>
+          </p:cNvSpPr>
+          <p:nvPr>
+            <p:ph type="ftr" sz="quarter" idx="11"/>
+          </p:nvPr>
+        </p:nvSpPr>
+        <p:spPr/>
+        <p:txBody>
+          <a:bodyPr/>
+          <a:lstStyle/>
+          <a:p>
+            <a:r>
+              <a:rPr lang="cs-CZ"/>
+              <a:t>Akademický rok 2023/24</a:t>
+            </a:r>
+            <a:endParaRPr lang="cs-CZ" dirty="0"/>
+          </a:p>
+        </p:txBody>
+      </p:sp>
     </p:spTree>
     <p:extLst>
       <p:ext uri="{BB962C8B-B14F-4D97-AF65-F5344CB8AC3E}">
@@ -8067,9 +8228,9 @@
           <a:lstStyle/>
           <a:p>
             <a:pPr algn="ctr"/>
-            <a:fld id="{E316F59F-A63E-4905-B787-C68437A620E5}" type="datetime1">
+            <a:fld id="{09C763AB-3F91-9941-A3E6-EBD43A8B18A8}" type="datetime1">
               <a:rPr lang="cs-CZ" smtClean="0"/>
-              <a:t>15.10.2020</a:t>
+              <a:t>12.11.2023</a:t>
             </a:fld>
             <a:endParaRPr lang="cs-CZ" dirty="0"/>
           </a:p>
@@ -8134,6 +8295,35 @@
           </a:prstGeom>
         </p:spPr>
       </p:pic>
+      <p:sp>
+        <p:nvSpPr>
+          <p:cNvPr id="5" name="Zástupný symbol pro zápatí 4">
+            <a:extLst>
+              <a:ext uri="{FF2B5EF4-FFF2-40B4-BE49-F238E27FC236}">
+                <a16:creationId xmlns:a16="http://schemas.microsoft.com/office/drawing/2014/main" id="{9B21D227-39A6-3C67-2251-0E4490A1D2BF}"/>
+              </a:ext>
+            </a:extLst>
+          </p:cNvPr>
+          <p:cNvSpPr>
+            <a:spLocks noGrp="1"/>
+          </p:cNvSpPr>
+          <p:nvPr>
+            <p:ph type="ftr" sz="quarter" idx="11"/>
+          </p:nvPr>
+        </p:nvSpPr>
+        <p:spPr/>
+        <p:txBody>
+          <a:bodyPr/>
+          <a:lstStyle/>
+          <a:p>
+            <a:r>
+              <a:rPr lang="cs-CZ"/>
+              <a:t>Akademický rok 2023/24</a:t>
+            </a:r>
+            <a:endParaRPr lang="cs-CZ" dirty="0"/>
+          </a:p>
+        </p:txBody>
+      </p:sp>
     </p:spTree>
     <p:extLst>
       <p:ext uri="{BB962C8B-B14F-4D97-AF65-F5344CB8AC3E}">
@@ -8344,9 +8534,9 @@
           <a:lstStyle/>
           <a:p>
             <a:pPr algn="ctr"/>
-            <a:fld id="{E316F59F-A63E-4905-B787-C68437A620E5}" type="datetime1">
+            <a:fld id="{8641357A-7DFF-C349-96A8-767A92F69ED3}" type="datetime1">
               <a:rPr lang="cs-CZ" smtClean="0"/>
-              <a:t>15.10.2020</a:t>
+              <a:t>12.11.2023</a:t>
             </a:fld>
             <a:endParaRPr lang="cs-CZ" dirty="0"/>
           </a:p>
@@ -8458,6 +8648,35 @@
           </a:prstGeom>
         </p:spPr>
       </p:pic>
+      <p:sp>
+        <p:nvSpPr>
+          <p:cNvPr id="5" name="Zástupný symbol pro zápatí 4">
+            <a:extLst>
+              <a:ext uri="{FF2B5EF4-FFF2-40B4-BE49-F238E27FC236}">
+                <a16:creationId xmlns:a16="http://schemas.microsoft.com/office/drawing/2014/main" id="{EF86B9D5-77AF-E415-538C-03801B2D235A}"/>
+              </a:ext>
+            </a:extLst>
+          </p:cNvPr>
+          <p:cNvSpPr>
+            <a:spLocks noGrp="1"/>
+          </p:cNvSpPr>
+          <p:nvPr>
+            <p:ph type="ftr" sz="quarter" idx="11"/>
+          </p:nvPr>
+        </p:nvSpPr>
+        <p:spPr/>
+        <p:txBody>
+          <a:bodyPr/>
+          <a:lstStyle/>
+          <a:p>
+            <a:r>
+              <a:rPr lang="cs-CZ"/>
+              <a:t>Akademický rok 2023/24</a:t>
+            </a:r>
+            <a:endParaRPr lang="cs-CZ" dirty="0"/>
+          </a:p>
+        </p:txBody>
+      </p:sp>
     </p:spTree>
     <p:extLst>
       <p:ext uri="{BB962C8B-B14F-4D97-AF65-F5344CB8AC3E}">
@@ -8650,9 +8869,9 @@
           <a:lstStyle/>
           <a:p>
             <a:pPr algn="ctr"/>
-            <a:fld id="{E316F59F-A63E-4905-B787-C68437A620E5}" type="datetime1">
+            <a:fld id="{4439282E-E392-1A43-AA1A-D4BFD8D2E5AF}" type="datetime1">
               <a:rPr lang="cs-CZ" smtClean="0"/>
-              <a:t>15.10.2020</a:t>
+              <a:t>12.11.2023</a:t>
             </a:fld>
             <a:endParaRPr lang="cs-CZ" dirty="0"/>
           </a:p>
@@ -8777,6 +8996,35 @@
           </a:prstGeom>
         </p:spPr>
       </p:pic>
+      <p:sp>
+        <p:nvSpPr>
+          <p:cNvPr id="5" name="Zástupný symbol pro zápatí 4">
+            <a:extLst>
+              <a:ext uri="{FF2B5EF4-FFF2-40B4-BE49-F238E27FC236}">
+                <a16:creationId xmlns:a16="http://schemas.microsoft.com/office/drawing/2014/main" id="{22B06A9C-3A23-D793-4CF8-B1C674668C41}"/>
+              </a:ext>
+            </a:extLst>
+          </p:cNvPr>
+          <p:cNvSpPr>
+            <a:spLocks noGrp="1"/>
+          </p:cNvSpPr>
+          <p:nvPr>
+            <p:ph type="ftr" sz="quarter" idx="11"/>
+          </p:nvPr>
+        </p:nvSpPr>
+        <p:spPr/>
+        <p:txBody>
+          <a:bodyPr/>
+          <a:lstStyle/>
+          <a:p>
+            <a:r>
+              <a:rPr lang="cs-CZ"/>
+              <a:t>Akademický rok 2023/24</a:t>
+            </a:r>
+            <a:endParaRPr lang="cs-CZ" dirty="0"/>
+          </a:p>
+        </p:txBody>
+      </p:sp>
     </p:spTree>
     <p:extLst>
       <p:ext uri="{BB962C8B-B14F-4D97-AF65-F5344CB8AC3E}">
@@ -8926,9 +9174,9 @@
           <a:lstStyle/>
           <a:p>
             <a:pPr algn="ctr"/>
-            <a:fld id="{E316F59F-A63E-4905-B787-C68437A620E5}" type="datetime1">
+            <a:fld id="{8135456B-8C41-094F-9483-E92AC16F80AA}" type="datetime1">
               <a:rPr lang="cs-CZ" smtClean="0"/>
-              <a:t>15.10.2020</a:t>
+              <a:t>12.11.2023</a:t>
             </a:fld>
             <a:endParaRPr lang="cs-CZ" dirty="0"/>
           </a:p>
@@ -9023,6 +9271,35 @@
           </a:prstGeom>
         </p:spPr>
       </p:pic>
+      <p:sp>
+        <p:nvSpPr>
+          <p:cNvPr id="5" name="Zástupný symbol pro zápatí 4">
+            <a:extLst>
+              <a:ext uri="{FF2B5EF4-FFF2-40B4-BE49-F238E27FC236}">
+                <a16:creationId xmlns:a16="http://schemas.microsoft.com/office/drawing/2014/main" id="{1817FA4A-B723-8E22-250D-88519835130E}"/>
+              </a:ext>
+            </a:extLst>
+          </p:cNvPr>
+          <p:cNvSpPr>
+            <a:spLocks noGrp="1"/>
+          </p:cNvSpPr>
+          <p:nvPr>
+            <p:ph type="ftr" sz="quarter" idx="11"/>
+          </p:nvPr>
+        </p:nvSpPr>
+        <p:spPr/>
+        <p:txBody>
+          <a:bodyPr/>
+          <a:lstStyle/>
+          <a:p>
+            <a:r>
+              <a:rPr lang="cs-CZ"/>
+              <a:t>Akademický rok 2023/24</a:t>
+            </a:r>
+            <a:endParaRPr lang="cs-CZ" dirty="0"/>
+          </a:p>
+        </p:txBody>
+      </p:sp>
     </p:spTree>
     <p:extLst>
       <p:ext uri="{BB962C8B-B14F-4D97-AF65-F5344CB8AC3E}">
@@ -9155,9 +9432,9 @@
           <a:lstStyle/>
           <a:p>
             <a:pPr algn="ctr"/>
-            <a:fld id="{E316F59F-A63E-4905-B787-C68437A620E5}" type="datetime1">
+            <a:fld id="{F0C82E70-51E0-9547-A109-8752D03F585A}" type="datetime1">
               <a:rPr lang="cs-CZ" smtClean="0"/>
-              <a:t>15.10.2020</a:t>
+              <a:t>12.11.2023</a:t>
             </a:fld>
             <a:endParaRPr lang="cs-CZ" dirty="0"/>
           </a:p>
@@ -9252,6 +9529,35 @@
           </a:prstGeom>
         </p:spPr>
       </p:pic>
+      <p:sp>
+        <p:nvSpPr>
+          <p:cNvPr id="5" name="Zástupný symbol pro zápatí 4">
+            <a:extLst>
+              <a:ext uri="{FF2B5EF4-FFF2-40B4-BE49-F238E27FC236}">
+                <a16:creationId xmlns:a16="http://schemas.microsoft.com/office/drawing/2014/main" id="{CFCF7B1F-8B63-66D3-1DAD-C0E204277534}"/>
+              </a:ext>
+            </a:extLst>
+          </p:cNvPr>
+          <p:cNvSpPr>
+            <a:spLocks noGrp="1"/>
+          </p:cNvSpPr>
+          <p:nvPr>
+            <p:ph type="ftr" sz="quarter" idx="11"/>
+          </p:nvPr>
+        </p:nvSpPr>
+        <p:spPr/>
+        <p:txBody>
+          <a:bodyPr/>
+          <a:lstStyle/>
+          <a:p>
+            <a:r>
+              <a:rPr lang="cs-CZ"/>
+              <a:t>Akademický rok 2023/24</a:t>
+            </a:r>
+            <a:endParaRPr lang="cs-CZ" dirty="0"/>
+          </a:p>
+        </p:txBody>
+      </p:sp>
     </p:spTree>
     <p:extLst>
       <p:ext uri="{BB962C8B-B14F-4D97-AF65-F5344CB8AC3E}">
@@ -9402,9 +9708,9 @@
           <a:bodyPr/>
           <a:lstStyle/>
           <a:p>
-            <a:fld id="{06539A90-2727-4345-B98F-2B616E5D1E48}" type="datetime1">
+            <a:fld id="{00A56087-27DB-194B-8F2F-6EB698F0D2E6}" type="datetime1">
               <a:rPr lang="cs-CZ" smtClean="0"/>
-              <a:t>15.10.2020</a:t>
+              <a:t>12.11.2023</a:t>
             </a:fld>
             <a:endParaRPr lang="cs-CZ"/>
           </a:p>
@@ -9533,6 +9839,34 @@
           </a:prstGeom>
         </p:spPr>
       </p:pic>
+      <p:sp>
+        <p:nvSpPr>
+          <p:cNvPr id="4" name="Zástupný symbol pro zápatí 3">
+            <a:extLst>
+              <a:ext uri="{FF2B5EF4-FFF2-40B4-BE49-F238E27FC236}">
+                <a16:creationId xmlns:a16="http://schemas.microsoft.com/office/drawing/2014/main" id="{4B58EC39-7E29-B752-84F8-BD3E0D4D0FB4}"/>
+              </a:ext>
+            </a:extLst>
+          </p:cNvPr>
+          <p:cNvSpPr>
+            <a:spLocks noGrp="1"/>
+          </p:cNvSpPr>
+          <p:nvPr>
+            <p:ph type="ftr" sz="quarter" idx="11"/>
+          </p:nvPr>
+        </p:nvSpPr>
+        <p:spPr/>
+        <p:txBody>
+          <a:bodyPr/>
+          <a:lstStyle/>
+          <a:p>
+            <a:r>
+              <a:rPr lang="cs-CZ"/>
+              <a:t>Akademický rok 2023/24</a:t>
+            </a:r>
+          </a:p>
+        </p:txBody>
+      </p:sp>
     </p:spTree>
     <p:extLst>
       <p:ext uri="{BB962C8B-B14F-4D97-AF65-F5344CB8AC3E}">
@@ -10727,21 +11061,6 @@
 </file>
 
 <file path=customXml/item1.xml><?xml version="1.0" encoding="utf-8"?>
-<p:properties xmlns:p="http://schemas.microsoft.com/office/2006/metadata/properties" xmlns:xsi="http://www.w3.org/2001/XMLSchema-instance" xmlns:pc="http://schemas.microsoft.com/office/infopath/2007/PartnerControls">
-  <documentManagement/>
-</p:properties>
-</file>
-
-<file path=customXml/item2.xml><?xml version="1.0" encoding="utf-8"?>
-<?mso-contentType ?>
-<FormTemplates xmlns="http://schemas.microsoft.com/sharepoint/v3/contenttype/forms">
-  <Display>DocumentLibraryForm</Display>
-  <Edit>DocumentLibraryForm</Edit>
-  <New>DocumentLibraryForm</New>
-</FormTemplates>
-</file>
-
-<file path=customXml/item3.xml><?xml version="1.0" encoding="utf-8"?>
 <ct:contentTypeSchema xmlns:ct="http://schemas.microsoft.com/office/2006/metadata/contentType" xmlns:ma="http://schemas.microsoft.com/office/2006/metadata/properties/metaAttributes" ct:_="" ma:_="" ma:contentTypeName="Dokument" ma:contentTypeID="0x01010013E19A743FFEA74D9512F2DA97C869DF" ma:contentTypeVersion="5" ma:contentTypeDescription="Vytvoří nový dokument" ma:contentTypeScope="" ma:versionID="5b8022b7317184bad81eabe05408417b">
   <xsd:schema xmlns:xsd="http://www.w3.org/2001/XMLSchema" xmlns:xs="http://www.w3.org/2001/XMLSchema" xmlns:p="http://schemas.microsoft.com/office/2006/metadata/properties" xmlns:ns3="ac0d6c10-ec1e-4d54-ba6b-3ab92d8dfa0b" xmlns:ns4="4631c8b9-6495-4591-8316-26c441f1bad0" targetNamespace="http://schemas.microsoft.com/office/2006/metadata/properties" ma:root="true" ma:fieldsID="a65cbd4495be7c179ad83fc920edffdc" ns3:_="" ns4:_="">
     <xsd:import namespace="ac0d6c10-ec1e-4d54-ba6b-3ab92d8dfa0b"/>
@@ -10912,32 +11231,22 @@
 </ct:contentTypeSchema>
 </file>
 
-<file path=customXml/itemProps1.xml><?xml version="1.0" encoding="utf-8"?>
-<ds:datastoreItem xmlns:ds="http://schemas.openxmlformats.org/officeDocument/2006/customXml" ds:itemID="{00CC2927-C183-410C-89DC-7252EBFBABAB}">
-  <ds:schemaRefs>
-    <ds:schemaRef ds:uri="http://purl.org/dc/dcmitype/"/>
-    <ds:schemaRef ds:uri="http://purl.org/dc/terms/"/>
-    <ds:schemaRef ds:uri="4631c8b9-6495-4591-8316-26c441f1bad0"/>
-    <ds:schemaRef ds:uri="http://schemas.microsoft.com/office/infopath/2007/PartnerControls"/>
-    <ds:schemaRef ds:uri="http://schemas.microsoft.com/office/2006/metadata/properties"/>
-    <ds:schemaRef ds:uri="http://www.w3.org/XML/1998/namespace"/>
-    <ds:schemaRef ds:uri="http://schemas.microsoft.com/office/2006/documentManagement/types"/>
-    <ds:schemaRef ds:uri="http://schemas.openxmlformats.org/package/2006/metadata/core-properties"/>
-    <ds:schemaRef ds:uri="http://purl.org/dc/elements/1.1/"/>
-    <ds:schemaRef ds:uri="ac0d6c10-ec1e-4d54-ba6b-3ab92d8dfa0b"/>
-  </ds:schemaRefs>
-</ds:datastoreItem>
+<file path=customXml/item2.xml><?xml version="1.0" encoding="utf-8"?>
+<?mso-contentType ?>
+<FormTemplates xmlns="http://schemas.microsoft.com/sharepoint/v3/contenttype/forms">
+  <Display>DocumentLibraryForm</Display>
+  <Edit>DocumentLibraryForm</Edit>
+  <New>DocumentLibraryForm</New>
+</FormTemplates>
 </file>
 
-<file path=customXml/itemProps2.xml><?xml version="1.0" encoding="utf-8"?>
-<ds:datastoreItem xmlns:ds="http://schemas.openxmlformats.org/officeDocument/2006/customXml" ds:itemID="{E3DD9B41-AE9F-4EFE-AF6A-D66906DDA423}">
-  <ds:schemaRefs>
-    <ds:schemaRef ds:uri="http://schemas.microsoft.com/sharepoint/v3/contenttype/forms"/>
-  </ds:schemaRefs>
-</ds:datastoreItem>
+<file path=customXml/item3.xml><?xml version="1.0" encoding="utf-8"?>
+<p:properties xmlns:p="http://schemas.microsoft.com/office/2006/metadata/properties" xmlns:xsi="http://www.w3.org/2001/XMLSchema-instance" xmlns:pc="http://schemas.microsoft.com/office/infopath/2007/PartnerControls">
+  <documentManagement/>
+</p:properties>
 </file>
 
-<file path=customXml/itemProps3.xml><?xml version="1.0" encoding="utf-8"?>
+<file path=customXml/itemProps1.xml><?xml version="1.0" encoding="utf-8"?>
 <ds:datastoreItem xmlns:ds="http://schemas.openxmlformats.org/officeDocument/2006/customXml" ds:itemID="{669A7244-861E-4C33-BF7F-BCF5F6814FA3}">
   <ds:schemaRefs>
     <ds:schemaRef ds:uri="http://schemas.microsoft.com/office/2006/metadata/contentType"/>
@@ -10954,4 +11263,29 @@
     <ds:schemaRef ds:uri="http://schemas.microsoft.com/internal/obd"/>
   </ds:schemaRefs>
 </ds:datastoreItem>
+</file>
+
+<file path=customXml/itemProps2.xml><?xml version="1.0" encoding="utf-8"?>
+<ds:datastoreItem xmlns:ds="http://schemas.openxmlformats.org/officeDocument/2006/customXml" ds:itemID="{E3DD9B41-AE9F-4EFE-AF6A-D66906DDA423}">
+  <ds:schemaRefs>
+    <ds:schemaRef ds:uri="http://schemas.microsoft.com/sharepoint/v3/contenttype/forms"/>
+  </ds:schemaRefs>
+</ds:datastoreItem>
+</file>
+
+<file path=customXml/itemProps3.xml><?xml version="1.0" encoding="utf-8"?>
+<ds:datastoreItem xmlns:ds="http://schemas.openxmlformats.org/officeDocument/2006/customXml" ds:itemID="{00CC2927-C183-410C-89DC-7252EBFBABAB}">
+  <ds:schemaRefs>
+    <ds:schemaRef ds:uri="http://purl.org/dc/dcmitype/"/>
+    <ds:schemaRef ds:uri="http://purl.org/dc/terms/"/>
+    <ds:schemaRef ds:uri="4631c8b9-6495-4591-8316-26c441f1bad0"/>
+    <ds:schemaRef ds:uri="http://schemas.microsoft.com/office/infopath/2007/PartnerControls"/>
+    <ds:schemaRef ds:uri="http://schemas.microsoft.com/office/2006/metadata/properties"/>
+    <ds:schemaRef ds:uri="http://www.w3.org/XML/1998/namespace"/>
+    <ds:schemaRef ds:uri="http://schemas.microsoft.com/office/2006/documentManagement/types"/>
+    <ds:schemaRef ds:uri="http://schemas.openxmlformats.org/package/2006/metadata/core-properties"/>
+    <ds:schemaRef ds:uri="http://purl.org/dc/elements/1.1/"/>
+    <ds:schemaRef ds:uri="ac0d6c10-ec1e-4d54-ba6b-3ab92d8dfa0b"/>
+  </ds:schemaRefs>
+</ds:datastoreItem>
 </file>
</xml_diff>